<commit_message>
Update TDD lecture and add lecture notes.
</commit_message>
<xml_diff>
--- a/Lectures/Test Driven Design/Test Driven Design.pptx
+++ b/Lectures/Test Driven Design/Test Driven Design.pptx
@@ -200,7 +200,7 @@
           <a:p>
             <a:fld id="{DBE0ECA1-3FBF-48AE-AD2A-4439AE745E19}" type="datetimeFigureOut">
               <a:rPr lang="en-US" smtClean="0"/>
-              <a:t>10/18/2013</a:t>
+              <a:t>1/18/2014</a:t>
             </a:fld>
             <a:endParaRPr lang="en-US"/>
           </a:p>
@@ -661,7 +661,7 @@
           <a:p>
             <a:fld id="{9769DED8-28D4-45B9-A00F-7CFE9335FEA6}" type="datetime1">
               <a:rPr lang="en-US" smtClean="0"/>
-              <a:t>10/18/2013</a:t>
+              <a:t>1/18/2014</a:t>
             </a:fld>
             <a:endParaRPr lang="en-US"/>
           </a:p>
@@ -926,7 +926,7 @@
           <a:p>
             <a:fld id="{2DB3D439-1F88-44B4-B5F7-F9BCD4064257}" type="datetime1">
               <a:rPr lang="en-US" smtClean="0"/>
-              <a:t>10/18/2013</a:t>
+              <a:t>1/18/2014</a:t>
             </a:fld>
             <a:endParaRPr lang="en-US"/>
           </a:p>
@@ -1101,7 +1101,7 @@
           <a:p>
             <a:fld id="{99C5638F-6F55-4055-935C-67841BE78C36}" type="datetime1">
               <a:rPr lang="en-US" smtClean="0"/>
-              <a:t>10/18/2013</a:t>
+              <a:t>1/18/2014</a:t>
             </a:fld>
             <a:endParaRPr lang="en-US"/>
           </a:p>
@@ -1266,7 +1266,7 @@
           <a:p>
             <a:fld id="{E6987D90-0C92-4B22-A29D-FED15412CED2}" type="datetime1">
               <a:rPr lang="en-US" smtClean="0"/>
-              <a:t>10/18/2013</a:t>
+              <a:t>1/18/2014</a:t>
             </a:fld>
             <a:endParaRPr lang="en-US"/>
           </a:p>
@@ -1515,7 +1515,7 @@
           <a:p>
             <a:fld id="{DDB67BC4-9554-49E0-BCB3-D1EF965BA0B8}" type="datetime1">
               <a:rPr lang="en-US" smtClean="0"/>
-              <a:t>10/18/2013</a:t>
+              <a:t>1/18/2014</a:t>
             </a:fld>
             <a:endParaRPr lang="en-US"/>
           </a:p>
@@ -1798,7 +1798,7 @@
           <a:p>
             <a:fld id="{EC24D770-803D-4E01-921C-9C100DD8230C}" type="datetime1">
               <a:rPr lang="en-US" smtClean="0"/>
-              <a:t>10/18/2013</a:t>
+              <a:t>1/18/2014</a:t>
             </a:fld>
             <a:endParaRPr lang="en-US"/>
           </a:p>
@@ -2237,7 +2237,7 @@
           <a:p>
             <a:fld id="{356AD44B-78A4-4209-8070-7DCBE2DC4992}" type="datetime1">
               <a:rPr lang="en-US" smtClean="0"/>
-              <a:t>10/18/2013</a:t>
+              <a:t>1/18/2014</a:t>
             </a:fld>
             <a:endParaRPr lang="en-US"/>
           </a:p>
@@ -2350,7 +2350,7 @@
           <a:p>
             <a:fld id="{A993C59A-7CA2-467F-B7F1-9096881A01B8}" type="datetime1">
               <a:rPr lang="en-US" smtClean="0"/>
-              <a:t>10/18/2013</a:t>
+              <a:t>1/18/2014</a:t>
             </a:fld>
             <a:endParaRPr lang="en-US"/>
           </a:p>
@@ -2440,7 +2440,7 @@
           <a:p>
             <a:fld id="{2B6B58D0-2488-434A-8ED1-692E09B85CC5}" type="datetime1">
               <a:rPr lang="en-US" smtClean="0"/>
-              <a:t>10/18/2013</a:t>
+              <a:t>1/18/2014</a:t>
             </a:fld>
             <a:endParaRPr lang="en-US"/>
           </a:p>
@@ -2682,7 +2682,7 @@
           <a:p>
             <a:fld id="{FDB0AFC2-7D64-4F61-A7B7-9932D3305DDA}" type="datetime1">
               <a:rPr lang="en-US" smtClean="0"/>
-              <a:t>10/18/2013</a:t>
+              <a:t>1/18/2014</a:t>
             </a:fld>
             <a:endParaRPr lang="en-US"/>
           </a:p>
@@ -2976,7 +2976,7 @@
           <a:p>
             <a:fld id="{4983D17A-D7B2-4ECE-8A2C-93679B9D177B}" type="datetime1">
               <a:rPr lang="en-US" smtClean="0"/>
-              <a:t>10/18/2013</a:t>
+              <a:t>1/18/2014</a:t>
             </a:fld>
             <a:endParaRPr lang="en-US"/>
           </a:p>
@@ -3270,7 +3270,7 @@
           <a:p>
             <a:fld id="{2A5275F7-419E-4C23-8A3D-2EE5742B2EC9}" type="datetime1">
               <a:rPr lang="en-US" smtClean="0"/>
-              <a:t>10/18/2013</a:t>
+              <a:t>1/18/2014</a:t>
             </a:fld>
             <a:endParaRPr lang="en-US"/>
           </a:p>
@@ -4656,8 +4656,17 @@
             </a:r>
             <a:r>
               <a:rPr lang="en-US" b="0" dirty="0"/>
-              <a:t>) no code at all-&gt;code that employs nil</a:t>
-            </a:r>
+              <a:t>) no code at all-&gt;code that </a:t>
+            </a:r>
+            <a:r>
+              <a:rPr lang="en-US" b="0"/>
+              <a:t>employs </a:t>
+            </a:r>
+            <a:r>
+              <a:rPr lang="en-US" b="0" smtClean="0"/>
+              <a:t>null</a:t>
+            </a:r>
+            <a:endParaRPr lang="en-US" b="0" dirty="0"/>
           </a:p>
           <a:p>
             <a:pPr fontAlgn="base"/>

</xml_diff>

<commit_message>
More updates to the TDD lecture.
</commit_message>
<xml_diff>
--- a/Lectures/Test Driven Design/Test Driven Design.pptx
+++ b/Lectures/Test Driven Design/Test Driven Design.pptx
@@ -5,18 +5,20 @@
     <p:sldMasterId id="2147483660" r:id="rId1"/>
   </p:sldMasterIdLst>
   <p:notesMasterIdLst>
-    <p:notesMasterId r:id="rId11"/>
+    <p:notesMasterId r:id="rId13"/>
   </p:notesMasterIdLst>
   <p:sldIdLst>
     <p:sldId id="256" r:id="rId2"/>
     <p:sldId id="257" r:id="rId3"/>
     <p:sldId id="258" r:id="rId4"/>
-    <p:sldId id="259" r:id="rId5"/>
-    <p:sldId id="260" r:id="rId6"/>
-    <p:sldId id="261" r:id="rId7"/>
-    <p:sldId id="262" r:id="rId8"/>
-    <p:sldId id="263" r:id="rId9"/>
-    <p:sldId id="264" r:id="rId10"/>
+    <p:sldId id="260" r:id="rId5"/>
+    <p:sldId id="261" r:id="rId6"/>
+    <p:sldId id="262" r:id="rId7"/>
+    <p:sldId id="259" r:id="rId8"/>
+    <p:sldId id="265" r:id="rId9"/>
+    <p:sldId id="266" r:id="rId10"/>
+    <p:sldId id="263" r:id="rId11"/>
+    <p:sldId id="264" r:id="rId12"/>
   </p:sldIdLst>
   <p:sldSz cx="9144000" cy="6858000" type="screen4x3"/>
   <p:notesSz cx="6858000" cy="9144000"/>
@@ -3848,6 +3850,346 @@
 </p:sld>
 </file>
 
+<file path=ppt/slides/slide10.xml><?xml version="1.0" encoding="utf-8"?>
+<p:sld xmlns:a="http://schemas.openxmlformats.org/drawingml/2006/main" xmlns:r="http://schemas.openxmlformats.org/officeDocument/2006/relationships" xmlns:p="http://schemas.openxmlformats.org/presentationml/2006/main">
+  <p:cSld>
+    <p:spTree>
+      <p:nvGrpSpPr>
+        <p:cNvPr id="1" name=""/>
+        <p:cNvGrpSpPr/>
+        <p:nvPr/>
+      </p:nvGrpSpPr>
+      <p:grpSpPr>
+        <a:xfrm>
+          <a:off x="0" y="0"/>
+          <a:ext cx="0" cy="0"/>
+          <a:chOff x="0" y="0"/>
+          <a:chExt cx="0" cy="0"/>
+        </a:xfrm>
+      </p:grpSpPr>
+      <p:sp>
+        <p:nvSpPr>
+          <p:cNvPr id="2" name="Title 1"/>
+          <p:cNvSpPr>
+            <a:spLocks noGrp="1"/>
+          </p:cNvSpPr>
+          <p:nvPr>
+            <p:ph type="title"/>
+          </p:nvPr>
+        </p:nvSpPr>
+        <p:spPr/>
+        <p:txBody>
+          <a:bodyPr/>
+          <a:lstStyle/>
+          <a:p>
+            <a:r>
+              <a:rPr lang="en-US" dirty="0" smtClean="0"/>
+              <a:t>TDD Guidelines</a:t>
+            </a:r>
+            <a:endParaRPr lang="en-US" dirty="0"/>
+          </a:p>
+        </p:txBody>
+      </p:sp>
+      <p:sp>
+        <p:nvSpPr>
+          <p:cNvPr id="3" name="Content Placeholder 2"/>
+          <p:cNvSpPr>
+            <a:spLocks noGrp="1"/>
+          </p:cNvSpPr>
+          <p:nvPr>
+            <p:ph idx="1"/>
+          </p:nvPr>
+        </p:nvSpPr>
+        <p:spPr/>
+        <p:txBody>
+          <a:bodyPr>
+            <a:normAutofit lnSpcReduction="10000"/>
+          </a:bodyPr>
+          <a:lstStyle/>
+          <a:p>
+            <a:r>
+              <a:rPr lang="en-US" dirty="0" smtClean="0"/>
+              <a:t>The following guidelines will help you write better tests</a:t>
+            </a:r>
+          </a:p>
+          <a:p>
+            <a:pPr marL="800100" lvl="1" indent="-342900"/>
+            <a:r>
+              <a:rPr lang="en-US" dirty="0" smtClean="0"/>
+              <a:t>Each test verifies exactly one thing </a:t>
+            </a:r>
+            <a:r>
+              <a:rPr lang="en-US" dirty="0" smtClean="0"/>
+              <a:t>– one </a:t>
+            </a:r>
+            <a:r>
+              <a:rPr lang="en-US" dirty="0" smtClean="0"/>
+              <a:t>assert per test</a:t>
+            </a:r>
+          </a:p>
+          <a:p>
+            <a:pPr marL="800100" lvl="1" indent="-342900"/>
+            <a:r>
+              <a:rPr lang="en-US" dirty="0" smtClean="0"/>
+              <a:t>Use a descriptive name for each test</a:t>
+            </a:r>
+          </a:p>
+          <a:p>
+            <a:pPr marL="800100" lvl="1" indent="-342900"/>
+            <a:r>
+              <a:rPr lang="en-US" dirty="0" smtClean="0"/>
+              <a:t>Think about building tests with this structure:</a:t>
+            </a:r>
+          </a:p>
+          <a:p>
+            <a:pPr marL="1485900" lvl="2" indent="-342900"/>
+            <a:r>
+              <a:rPr lang="en-US" dirty="0" smtClean="0"/>
+              <a:t>Given</a:t>
+            </a:r>
+          </a:p>
+          <a:p>
+            <a:pPr marL="1485900" lvl="2" indent="-342900"/>
+            <a:r>
+              <a:rPr lang="en-US" dirty="0" smtClean="0"/>
+              <a:t>When</a:t>
+            </a:r>
+          </a:p>
+          <a:p>
+            <a:pPr marL="1485900" lvl="2" indent="-342900"/>
+            <a:r>
+              <a:rPr lang="en-US" dirty="0" smtClean="0"/>
+              <a:t>Then</a:t>
+            </a:r>
+          </a:p>
+          <a:p>
+            <a:pPr marL="800100" lvl="1" indent="-342900"/>
+            <a:r>
+              <a:rPr lang="en-US" dirty="0" smtClean="0"/>
+              <a:t>Always write a failing test first that fails as you expect</a:t>
+            </a:r>
+          </a:p>
+          <a:p>
+            <a:pPr marL="342900" indent="-342900"/>
+            <a:r>
+              <a:rPr lang="en-US" dirty="0" smtClean="0"/>
+              <a:t>TDD requires</a:t>
+            </a:r>
+          </a:p>
+          <a:p>
+            <a:pPr marL="800100" lvl="1" indent="-342900"/>
+            <a:r>
+              <a:rPr lang="en-US" dirty="0" smtClean="0"/>
+              <a:t>Practice</a:t>
+            </a:r>
+          </a:p>
+          <a:p>
+            <a:pPr marL="800100" lvl="1" indent="-342900"/>
+            <a:r>
+              <a:rPr lang="en-US" dirty="0" smtClean="0"/>
+              <a:t>Discipline</a:t>
+            </a:r>
+          </a:p>
+          <a:p>
+            <a:pPr marL="800100" lvl="1" indent="-342900"/>
+            <a:r>
+              <a:rPr lang="en-US" dirty="0" smtClean="0"/>
+              <a:t>Tenacity</a:t>
+            </a:r>
+          </a:p>
+        </p:txBody>
+      </p:sp>
+      <p:sp>
+        <p:nvSpPr>
+          <p:cNvPr id="4" name="Slide Number Placeholder 3"/>
+          <p:cNvSpPr>
+            <a:spLocks noGrp="1"/>
+          </p:cNvSpPr>
+          <p:nvPr>
+            <p:ph type="sldNum" sz="quarter" idx="12"/>
+          </p:nvPr>
+        </p:nvSpPr>
+        <p:spPr/>
+        <p:txBody>
+          <a:bodyPr/>
+          <a:lstStyle/>
+          <a:p>
+            <a:fld id="{6DA12B36-9664-4CB0-8B2E-F4A2F44AE97E}" type="slidenum">
+              <a:rPr lang="en-US" smtClean="0"/>
+              <a:t>10</a:t>
+            </a:fld>
+            <a:endParaRPr lang="en-US"/>
+          </a:p>
+        </p:txBody>
+      </p:sp>
+    </p:spTree>
+    <p:extLst>
+      <p:ext uri="{BB962C8B-B14F-4D97-AF65-F5344CB8AC3E}">
+        <p14:creationId xmlns:p14="http://schemas.microsoft.com/office/powerpoint/2010/main" val="1113473894"/>
+      </p:ext>
+    </p:extLst>
+  </p:cSld>
+  <p:clrMapOvr>
+    <a:masterClrMapping/>
+  </p:clrMapOvr>
+  <p:timing>
+    <p:tnLst>
+      <p:par>
+        <p:cTn id="1" dur="indefinite" restart="never" nodeType="tmRoot"/>
+      </p:par>
+    </p:tnLst>
+  </p:timing>
+</p:sld>
+</file>
+
+<file path=ppt/slides/slide11.xml><?xml version="1.0" encoding="utf-8"?>
+<p:sld xmlns:a="http://schemas.openxmlformats.org/drawingml/2006/main" xmlns:r="http://schemas.openxmlformats.org/officeDocument/2006/relationships" xmlns:p="http://schemas.openxmlformats.org/presentationml/2006/main">
+  <p:cSld>
+    <p:spTree>
+      <p:nvGrpSpPr>
+        <p:cNvPr id="1" name=""/>
+        <p:cNvGrpSpPr/>
+        <p:nvPr/>
+      </p:nvGrpSpPr>
+      <p:grpSpPr>
+        <a:xfrm>
+          <a:off x="0" y="0"/>
+          <a:ext cx="0" cy="0"/>
+          <a:chOff x="0" y="0"/>
+          <a:chExt cx="0" cy="0"/>
+        </a:xfrm>
+      </p:grpSpPr>
+      <p:sp>
+        <p:nvSpPr>
+          <p:cNvPr id="2" name="Title 1"/>
+          <p:cNvSpPr>
+            <a:spLocks noGrp="1"/>
+          </p:cNvSpPr>
+          <p:nvPr>
+            <p:ph type="title"/>
+          </p:nvPr>
+        </p:nvSpPr>
+        <p:spPr/>
+        <p:txBody>
+          <a:bodyPr/>
+          <a:lstStyle/>
+          <a:p>
+            <a:r>
+              <a:rPr lang="en-US" dirty="0" smtClean="0"/>
+              <a:t>Benefits of TDD</a:t>
+            </a:r>
+            <a:endParaRPr lang="en-US" dirty="0"/>
+          </a:p>
+        </p:txBody>
+      </p:sp>
+      <p:sp>
+        <p:nvSpPr>
+          <p:cNvPr id="3" name="Content Placeholder 2"/>
+          <p:cNvSpPr>
+            <a:spLocks noGrp="1"/>
+          </p:cNvSpPr>
+          <p:nvPr>
+            <p:ph idx="1"/>
+          </p:nvPr>
+        </p:nvSpPr>
+        <p:spPr/>
+        <p:txBody>
+          <a:bodyPr/>
+          <a:lstStyle/>
+          <a:p>
+            <a:r>
+              <a:rPr lang="en-US" dirty="0" smtClean="0"/>
+              <a:t>Test Driven Design provides some important benefits</a:t>
+            </a:r>
+          </a:p>
+          <a:p>
+            <a:pPr marL="800100" lvl="1" indent="-342900"/>
+            <a:r>
+              <a:rPr lang="en-US" dirty="0" smtClean="0"/>
+              <a:t>Your code does exactly what you expect, nothing more, nothing less</a:t>
+            </a:r>
+          </a:p>
+          <a:p>
+            <a:pPr marL="1485900" lvl="2" indent="-342900"/>
+            <a:r>
+              <a:rPr lang="en-US" dirty="0" smtClean="0"/>
+              <a:t>Aids in debugging complex problems</a:t>
+            </a:r>
+          </a:p>
+          <a:p>
+            <a:pPr marL="1485900" lvl="2" indent="-342900"/>
+            <a:r>
+              <a:rPr lang="en-US" dirty="0" smtClean="0"/>
+              <a:t>Concurrent development will challenge most of your expectations</a:t>
+            </a:r>
+          </a:p>
+          <a:p>
+            <a:pPr marL="1485900" lvl="2" indent="-342900"/>
+            <a:r>
+              <a:rPr lang="en-US" dirty="0" smtClean="0"/>
+              <a:t>Bugs become unexpected cases, not unexpected behavior</a:t>
+            </a:r>
+          </a:p>
+          <a:p>
+            <a:pPr marL="800100" lvl="1" indent="-342900"/>
+            <a:r>
+              <a:rPr lang="en-US" dirty="0" smtClean="0"/>
+              <a:t>The interface to your code is usually better</a:t>
+            </a:r>
+          </a:p>
+          <a:p>
+            <a:pPr marL="800100" lvl="1" indent="-342900"/>
+            <a:r>
+              <a:rPr lang="en-US" dirty="0" smtClean="0"/>
+              <a:t>Your can change the code in the future with confidence</a:t>
+            </a:r>
+            <a:endParaRPr lang="en-US" dirty="0"/>
+          </a:p>
+        </p:txBody>
+      </p:sp>
+      <p:sp>
+        <p:nvSpPr>
+          <p:cNvPr id="4" name="Slide Number Placeholder 3"/>
+          <p:cNvSpPr>
+            <a:spLocks noGrp="1"/>
+          </p:cNvSpPr>
+          <p:nvPr>
+            <p:ph type="sldNum" sz="quarter" idx="12"/>
+          </p:nvPr>
+        </p:nvSpPr>
+        <p:spPr/>
+        <p:txBody>
+          <a:bodyPr/>
+          <a:lstStyle/>
+          <a:p>
+            <a:fld id="{6DA12B36-9664-4CB0-8B2E-F4A2F44AE97E}" type="slidenum">
+              <a:rPr lang="en-US" smtClean="0"/>
+              <a:t>11</a:t>
+            </a:fld>
+            <a:endParaRPr lang="en-US"/>
+          </a:p>
+        </p:txBody>
+      </p:sp>
+    </p:spTree>
+    <p:extLst>
+      <p:ext uri="{BB962C8B-B14F-4D97-AF65-F5344CB8AC3E}">
+        <p14:creationId xmlns:p14="http://schemas.microsoft.com/office/powerpoint/2010/main" val="311232569"/>
+      </p:ext>
+    </p:extLst>
+  </p:cSld>
+  <p:clrMapOvr>
+    <a:masterClrMapping/>
+  </p:clrMapOvr>
+  <p:timing>
+    <p:tnLst>
+      <p:par>
+        <p:cTn id="1" dur="indefinite" restart="never" nodeType="tmRoot"/>
+      </p:par>
+    </p:tnLst>
+  </p:timing>
+</p:sld>
+</file>
+
 <file path=ppt/slides/slide2.xml><?xml version="1.0" encoding="utf-8"?>
 <p:sld xmlns:a="http://schemas.openxmlformats.org/drawingml/2006/main" xmlns:r="http://schemas.openxmlformats.org/officeDocument/2006/relationships" xmlns:p="http://schemas.openxmlformats.org/presentationml/2006/main">
   <p:cSld>
@@ -4156,6 +4498,13 @@
   <p:clrMapOvr>
     <a:masterClrMapping/>
   </p:clrMapOvr>
+  <p:timing>
+    <p:tnLst>
+      <p:par>
+        <p:cTn id="1" dur="indefinite" restart="never" nodeType="tmRoot"/>
+      </p:par>
+    </p:tnLst>
+  </p:timing>
 </p:sld>
 </file>
 
@@ -4193,7 +4542,7 @@
           <a:p>
             <a:r>
               <a:rPr lang="en-US" dirty="0" smtClean="0"/>
-              <a:t>TDD Example</a:t>
+              <a:t>TDD Rules for code changes</a:t>
             </a:r>
             <a:endParaRPr lang="en-US" dirty="0"/>
           </a:p>
@@ -4211,18 +4560,112 @@
         </p:nvSpPr>
         <p:spPr/>
         <p:txBody>
-          <a:bodyPr/>
-          <a:lstStyle/>
-          <a:p>
-            <a:r>
-              <a:rPr lang="en-US" dirty="0" smtClean="0"/>
-              <a:t>Let’s write a method to add two </a:t>
-            </a:r>
-            <a:r>
-              <a:rPr lang="en-US" smtClean="0"/>
-              <a:t>positive integers</a:t>
-            </a:r>
-            <a:endParaRPr lang="en-US" dirty="0" smtClean="0"/>
+          <a:bodyPr>
+            <a:normAutofit/>
+          </a:bodyPr>
+          <a:lstStyle/>
+          <a:p>
+            <a:r>
+              <a:rPr lang="en-US" dirty="0" smtClean="0"/>
+              <a:t>A fundamental part of TDD is code refactoring</a:t>
+            </a:r>
+          </a:p>
+          <a:p>
+            <a:pPr marL="800100" lvl="1" indent="-342900"/>
+            <a:r>
+              <a:rPr lang="en-US" dirty="0" smtClean="0"/>
+              <a:t>Refactor: Change the structure of code without changing its behavior</a:t>
+            </a:r>
+          </a:p>
+          <a:p>
+            <a:r>
+              <a:rPr lang="en-US" dirty="0" smtClean="0"/>
+              <a:t>Test Driven Design defines when you can change test and production code with this process</a:t>
+            </a:r>
+          </a:p>
+          <a:p>
+            <a:pPr marL="800100" lvl="1" indent="-342900"/>
+            <a:r>
+              <a:rPr lang="en-US" dirty="0" smtClean="0">
+                <a:solidFill>
+                  <a:srgbClr val="C00000"/>
+                </a:solidFill>
+              </a:rPr>
+              <a:t>Red </a:t>
+            </a:r>
+          </a:p>
+          <a:p>
+            <a:pPr marL="800100" lvl="1" indent="-342900"/>
+            <a:r>
+              <a:rPr lang="en-US" dirty="0" smtClean="0">
+                <a:solidFill>
+                  <a:srgbClr val="00B050"/>
+                </a:solidFill>
+              </a:rPr>
+              <a:t>Green</a:t>
+            </a:r>
+          </a:p>
+          <a:p>
+            <a:pPr marL="800100" lvl="1" indent="-342900"/>
+            <a:r>
+              <a:rPr lang="en-US" dirty="0" smtClean="0"/>
+              <a:t>Refactor</a:t>
+            </a:r>
+          </a:p>
+          <a:p>
+            <a:pPr marL="457200" indent="-457200">
+              <a:buFont typeface="+mj-lt"/>
+              <a:buAutoNum type="arabicPeriod"/>
+            </a:pPr>
+            <a:r>
+              <a:rPr lang="en-US" dirty="0" smtClean="0"/>
+              <a:t>Write test code to cause a failure (</a:t>
+            </a:r>
+            <a:r>
+              <a:rPr lang="en-US" dirty="0" smtClean="0">
+                <a:solidFill>
+                  <a:srgbClr val="C00000"/>
+                </a:solidFill>
+              </a:rPr>
+              <a:t>Red</a:t>
+            </a:r>
+            <a:r>
+              <a:rPr lang="en-US" dirty="0" smtClean="0"/>
+              <a:t>)</a:t>
+            </a:r>
+          </a:p>
+          <a:p>
+            <a:pPr marL="457200" indent="-457200">
+              <a:buFont typeface="+mj-lt"/>
+              <a:buAutoNum type="arabicPeriod"/>
+            </a:pPr>
+            <a:r>
+              <a:rPr lang="en-US" dirty="0" smtClean="0"/>
+              <a:t>Write production code to cause the test to pass (</a:t>
+            </a:r>
+            <a:r>
+              <a:rPr lang="en-US" dirty="0" smtClean="0">
+                <a:solidFill>
+                  <a:srgbClr val="00B050"/>
+                </a:solidFill>
+              </a:rPr>
+              <a:t>Green</a:t>
+            </a:r>
+            <a:r>
+              <a:rPr lang="en-US" dirty="0" smtClean="0"/>
+              <a:t>)</a:t>
+            </a:r>
+          </a:p>
+          <a:p>
+            <a:pPr marL="457200" indent="-457200">
+              <a:buFont typeface="+mj-lt"/>
+              <a:buAutoNum type="arabicPeriod"/>
+            </a:pPr>
+            <a:r>
+              <a:rPr lang="en-US" dirty="0" smtClean="0"/>
+              <a:t>Fix the production code with all tests passing (Refactor)</a:t>
+            </a:r>
+            <a:endParaRPr lang="en-US" dirty="0"/>
           </a:p>
         </p:txBody>
       </p:sp>
@@ -4252,13 +4695,20 @@
     </p:spTree>
     <p:extLst>
       <p:ext uri="{BB962C8B-B14F-4D97-AF65-F5344CB8AC3E}">
-        <p14:creationId xmlns:p14="http://schemas.microsoft.com/office/powerpoint/2010/main" val="3915016319"/>
+        <p14:creationId xmlns:p14="http://schemas.microsoft.com/office/powerpoint/2010/main" val="1766494275"/>
       </p:ext>
     </p:extLst>
   </p:cSld>
   <p:clrMapOvr>
     <a:masterClrMapping/>
   </p:clrMapOvr>
+  <p:timing>
+    <p:tnLst>
+      <p:par>
+        <p:cTn id="1" dur="indefinite" restart="never" nodeType="tmRoot"/>
+      </p:par>
+    </p:tnLst>
+  </p:timing>
 </p:sld>
 </file>
 
@@ -4296,7 +4746,7 @@
           <a:p>
             <a:r>
               <a:rPr lang="en-US" dirty="0" smtClean="0"/>
-              <a:t>TDD Rules for code changes</a:t>
+              <a:t>How to change production code</a:t>
             </a:r>
             <a:endParaRPr lang="en-US" dirty="0"/>
           </a:p>
@@ -4314,112 +4764,44 @@
         </p:nvSpPr>
         <p:spPr/>
         <p:txBody>
-          <a:bodyPr>
-            <a:normAutofit/>
-          </a:bodyPr>
-          <a:lstStyle/>
-          <a:p>
-            <a:r>
-              <a:rPr lang="en-US" dirty="0" smtClean="0"/>
-              <a:t>A fundamental part of TDD is code refactoring</a:t>
+          <a:bodyPr/>
+          <a:lstStyle/>
+          <a:p>
+            <a:r>
+              <a:rPr lang="en-US" dirty="0" smtClean="0"/>
+              <a:t>A transformation is the opposite of a refactoring</a:t>
             </a:r>
           </a:p>
           <a:p>
             <a:pPr marL="800100" lvl="1" indent="-342900"/>
             <a:r>
               <a:rPr lang="en-US" dirty="0" smtClean="0"/>
-              <a:t>Refactor: Change the structure of code without changing its behavior</a:t>
-            </a:r>
-          </a:p>
-          <a:p>
-            <a:r>
-              <a:rPr lang="en-US" dirty="0" smtClean="0"/>
-              <a:t>Test Driven Design defines when you can change test and production code with this process</a:t>
+              <a:t>Transformation: Change the behavior of the code with the minimum change to its structure</a:t>
+            </a:r>
+            <a:endParaRPr lang="en-US" dirty="0"/>
+          </a:p>
+          <a:p>
+            <a:r>
+              <a:rPr lang="en-US" dirty="0" smtClean="0"/>
+              <a:t>The Transformation Priority Premise defines how to change the behavior of production code to make a test pass.</a:t>
             </a:r>
           </a:p>
           <a:p>
             <a:pPr marL="800100" lvl="1" indent="-342900"/>
             <a:r>
-              <a:rPr lang="en-US" dirty="0" smtClean="0">
-                <a:solidFill>
-                  <a:srgbClr val="C00000"/>
-                </a:solidFill>
-              </a:rPr>
-              <a:t>Red </a:t>
+              <a:rPr lang="en-US" dirty="0" smtClean="0"/>
+              <a:t>Make the production code as specific as possible to keep all tests passing</a:t>
             </a:r>
           </a:p>
           <a:p>
             <a:pPr marL="800100" lvl="1" indent="-342900"/>
             <a:r>
-              <a:rPr lang="en-US" dirty="0" smtClean="0">
-                <a:solidFill>
-                  <a:srgbClr val="00B050"/>
-                </a:solidFill>
-              </a:rPr>
-              <a:t>Green</a:t>
-            </a:r>
-          </a:p>
-          <a:p>
-            <a:pPr marL="800100" lvl="1" indent="-342900"/>
-            <a:r>
-              <a:rPr lang="en-US" dirty="0" smtClean="0"/>
-              <a:t>Refactor</a:t>
-            </a:r>
-          </a:p>
-          <a:p>
-            <a:pPr marL="457200" indent="-457200">
-              <a:buFont typeface="+mj-lt"/>
-              <a:buAutoNum type="arabicPeriod"/>
-            </a:pPr>
-            <a:r>
-              <a:rPr lang="en-US" dirty="0" smtClean="0"/>
-              <a:t>Write test code to cause a failure (</a:t>
-            </a:r>
-            <a:r>
-              <a:rPr lang="en-US" dirty="0" smtClean="0">
-                <a:solidFill>
-                  <a:srgbClr val="C00000"/>
-                </a:solidFill>
-              </a:rPr>
-              <a:t>Red</a:t>
-            </a:r>
-            <a:r>
-              <a:rPr lang="en-US" dirty="0" smtClean="0"/>
-              <a:t>)</a:t>
-            </a:r>
-          </a:p>
-          <a:p>
-            <a:pPr marL="457200" indent="-457200">
-              <a:buFont typeface="+mj-lt"/>
-              <a:buAutoNum type="arabicPeriod"/>
-            </a:pPr>
-            <a:r>
-              <a:rPr lang="en-US" dirty="0" smtClean="0"/>
-              <a:t>Write production code to cause the test to pass (</a:t>
-            </a:r>
-            <a:r>
-              <a:rPr lang="en-US" dirty="0" smtClean="0">
-                <a:solidFill>
-                  <a:srgbClr val="00B050"/>
-                </a:solidFill>
-              </a:rPr>
-              <a:t>Green</a:t>
-            </a:r>
-            <a:r>
-              <a:rPr lang="en-US" dirty="0" smtClean="0"/>
-              <a:t>)</a:t>
-            </a:r>
-          </a:p>
-          <a:p>
-            <a:pPr marL="457200" indent="-457200">
-              <a:buFont typeface="+mj-lt"/>
-              <a:buAutoNum type="arabicPeriod"/>
-            </a:pPr>
-            <a:r>
-              <a:rPr lang="en-US" dirty="0" smtClean="0"/>
-              <a:t>Fix the production code with all tests passing (Refactor)</a:t>
-            </a:r>
-            <a:endParaRPr lang="en-US" dirty="0"/>
+              <a:rPr lang="en-US" dirty="0" smtClean="0"/>
+              <a:t>As the test code becomes more specific, the production code becomes more general.</a:t>
+            </a:r>
+          </a:p>
+          <a:p>
+            <a:endParaRPr lang="en-US" dirty="0" smtClean="0"/>
           </a:p>
         </p:txBody>
       </p:sp>
@@ -4449,13 +4831,20 @@
     </p:spTree>
     <p:extLst>
       <p:ext uri="{BB962C8B-B14F-4D97-AF65-F5344CB8AC3E}">
-        <p14:creationId xmlns:p14="http://schemas.microsoft.com/office/powerpoint/2010/main" val="1766494275"/>
+        <p14:creationId xmlns:p14="http://schemas.microsoft.com/office/powerpoint/2010/main" val="2847181626"/>
       </p:ext>
     </p:extLst>
   </p:cSld>
   <p:clrMapOvr>
     <a:masterClrMapping/>
   </p:clrMapOvr>
+  <p:timing>
+    <p:tnLst>
+      <p:par>
+        <p:cTn id="1" dur="indefinite" restart="never" nodeType="tmRoot"/>
+      </p:par>
+    </p:tnLst>
+  </p:timing>
 </p:sld>
 </file>
 
@@ -4493,7 +4882,7 @@
           <a:p>
             <a:r>
               <a:rPr lang="en-US" dirty="0" smtClean="0"/>
-              <a:t>How to change production code</a:t>
+              <a:t>Transformations</a:t>
             </a:r>
             <a:endParaRPr lang="en-US" dirty="0"/>
           </a:p>
@@ -4511,44 +4900,117 @@
         </p:nvSpPr>
         <p:spPr/>
         <p:txBody>
-          <a:bodyPr/>
-          <a:lstStyle/>
-          <a:p>
-            <a:r>
-              <a:rPr lang="en-US" dirty="0" smtClean="0"/>
-              <a:t>A transformation is the opposite of a refactoring</a:t>
-            </a:r>
-          </a:p>
-          <a:p>
-            <a:pPr marL="800100" lvl="1" indent="-342900"/>
-            <a:r>
-              <a:rPr lang="en-US" dirty="0" smtClean="0"/>
-              <a:t>Transformation: Change the behavior of the code with the minimum change to its structure</a:t>
-            </a:r>
+          <a:bodyPr>
+            <a:normAutofit fontScale="85000" lnSpcReduction="20000"/>
+          </a:bodyPr>
+          <a:lstStyle/>
+          <a:p>
+            <a:pPr fontAlgn="base"/>
+            <a:r>
+              <a:rPr lang="en-US" b="0" dirty="0"/>
+              <a:t>({}–&gt;</a:t>
+            </a:r>
+            <a:r>
+              <a:rPr lang="en-US" b="0" dirty="0" smtClean="0"/>
+              <a:t>null</a:t>
+            </a:r>
+            <a:r>
+              <a:rPr lang="en-US" b="0" dirty="0"/>
+              <a:t>) no code at all-&gt;code that employs </a:t>
+            </a:r>
+            <a:r>
+              <a:rPr lang="en-US" b="0" dirty="0" smtClean="0"/>
+              <a:t>null</a:t>
+            </a:r>
+            <a:endParaRPr lang="en-US" b="0" dirty="0"/>
+          </a:p>
+          <a:p>
+            <a:pPr fontAlgn="base"/>
+            <a:r>
+              <a:rPr lang="en-US" b="0" dirty="0"/>
+              <a:t>(</a:t>
+            </a:r>
+            <a:r>
+              <a:rPr lang="en-US" b="0" dirty="0" smtClean="0"/>
+              <a:t>null-</a:t>
+            </a:r>
+            <a:r>
+              <a:rPr lang="en-US" b="0" dirty="0"/>
+              <a:t>&gt;constant)</a:t>
+            </a:r>
+          </a:p>
+          <a:p>
+            <a:pPr fontAlgn="base"/>
+            <a:r>
+              <a:rPr lang="en-US" b="0" dirty="0"/>
+              <a:t>(constant-&gt;constant+) a simple constant to a more complex constant</a:t>
+            </a:r>
+          </a:p>
+          <a:p>
+            <a:pPr fontAlgn="base"/>
+            <a:r>
+              <a:rPr lang="en-US" b="0" dirty="0"/>
+              <a:t>(constant-&gt;scalar) replacing a constant with a variable or an argument</a:t>
+            </a:r>
+          </a:p>
+          <a:p>
+            <a:pPr fontAlgn="base"/>
+            <a:r>
+              <a:rPr lang="en-US" b="0" dirty="0"/>
+              <a:t>(statement-&gt;statements) adding more unconditional statements.</a:t>
+            </a:r>
+          </a:p>
+          <a:p>
+            <a:pPr fontAlgn="base"/>
+            <a:r>
+              <a:rPr lang="en-US" b="0" dirty="0"/>
+              <a:t>(unconditional-&gt;if) splitting the execution path</a:t>
+            </a:r>
+          </a:p>
+          <a:p>
+            <a:pPr fontAlgn="base"/>
+            <a:r>
+              <a:rPr lang="en-US" b="0" dirty="0"/>
+              <a:t>(scalar-&gt;array)</a:t>
+            </a:r>
+          </a:p>
+          <a:p>
+            <a:pPr fontAlgn="base"/>
+            <a:r>
+              <a:rPr lang="en-US" b="0" dirty="0"/>
+              <a:t>(array-&gt;container)</a:t>
+            </a:r>
+          </a:p>
+          <a:p>
+            <a:pPr fontAlgn="base"/>
+            <a:r>
+              <a:rPr lang="en-US" b="0" dirty="0"/>
+              <a:t>(statement-&gt;recursion)</a:t>
+            </a:r>
+          </a:p>
+          <a:p>
+            <a:pPr fontAlgn="base"/>
+            <a:r>
+              <a:rPr lang="en-US" b="0" dirty="0"/>
+              <a:t>(if-&gt;while)</a:t>
+            </a:r>
+          </a:p>
+          <a:p>
+            <a:pPr fontAlgn="base"/>
+            <a:r>
+              <a:rPr lang="en-US" b="0" dirty="0"/>
+              <a:t>(expression-&gt;function) replacing an expression with a function or algorithm</a:t>
+            </a:r>
+          </a:p>
+          <a:p>
+            <a:pPr fontAlgn="base"/>
+            <a:r>
+              <a:rPr lang="en-US" b="0" dirty="0"/>
+              <a:t>(variable-&gt;assignment) replacing the value of a variable.</a:t>
+            </a:r>
+          </a:p>
+          <a:p>
             <a:endParaRPr lang="en-US" dirty="0"/>
-          </a:p>
-          <a:p>
-            <a:r>
-              <a:rPr lang="en-US" dirty="0" smtClean="0"/>
-              <a:t>The Transformation Priority Premise defines how to change the behavior of production code to make a test pass.</a:t>
-            </a:r>
-          </a:p>
-          <a:p>
-            <a:pPr marL="800100" lvl="1" indent="-342900"/>
-            <a:r>
-              <a:rPr lang="en-US" dirty="0" smtClean="0"/>
-              <a:t>Make the production code as specific as possible to keep all tests passing</a:t>
-            </a:r>
-          </a:p>
-          <a:p>
-            <a:pPr marL="800100" lvl="1" indent="-342900"/>
-            <a:r>
-              <a:rPr lang="en-US" dirty="0" smtClean="0"/>
-              <a:t>As the test code becomes more specific, the production code becomes more general.</a:t>
-            </a:r>
-          </a:p>
-          <a:p>
-            <a:endParaRPr lang="en-US" dirty="0" smtClean="0"/>
           </a:p>
         </p:txBody>
       </p:sp>
@@ -4572,19 +5034,58 @@
               <a:t>6</a:t>
             </a:fld>
             <a:endParaRPr lang="en-US"/>
+          </a:p>
+        </p:txBody>
+      </p:sp>
+      <p:sp>
+        <p:nvSpPr>
+          <p:cNvPr id="6" name="Footer Placeholder 5"/>
+          <p:cNvSpPr>
+            <a:spLocks noGrp="1"/>
+          </p:cNvSpPr>
+          <p:nvPr>
+            <p:ph type="ftr" sz="quarter" idx="11"/>
+          </p:nvPr>
+        </p:nvSpPr>
+        <p:spPr/>
+        <p:txBody>
+          <a:bodyPr/>
+          <a:lstStyle/>
+          <a:p>
+            <a:r>
+              <a:rPr lang="en-US" dirty="0"/>
+              <a:t>Source: </a:t>
+            </a:r>
+            <a:r>
+              <a:rPr lang="en-US" dirty="0">
+                <a:hlinkClick r:id="rId2"/>
+              </a:rPr>
+              <a:t>Bob Martin</a:t>
+            </a:r>
+            <a:endParaRPr lang="en-US" dirty="0"/>
+          </a:p>
+          <a:p>
+            <a:endParaRPr lang="en-US" dirty="0"/>
           </a:p>
         </p:txBody>
       </p:sp>
     </p:spTree>
     <p:extLst>
       <p:ext uri="{BB962C8B-B14F-4D97-AF65-F5344CB8AC3E}">
-        <p14:creationId xmlns:p14="http://schemas.microsoft.com/office/powerpoint/2010/main" val="2847181626"/>
+        <p14:creationId xmlns:p14="http://schemas.microsoft.com/office/powerpoint/2010/main" val="3063786004"/>
       </p:ext>
     </p:extLst>
   </p:cSld>
   <p:clrMapOvr>
     <a:masterClrMapping/>
   </p:clrMapOvr>
+  <p:timing>
+    <p:tnLst>
+      <p:par>
+        <p:cTn id="1" dur="indefinite" restart="never" nodeType="tmRoot"/>
+      </p:par>
+    </p:tnLst>
+  </p:timing>
 </p:sld>
 </file>
 
@@ -4622,7 +5123,7 @@
           <a:p>
             <a:r>
               <a:rPr lang="en-US" dirty="0" smtClean="0"/>
-              <a:t>Transformations</a:t>
+              <a:t>TDD Example</a:t>
             </a:r>
             <a:endParaRPr lang="en-US" dirty="0"/>
           </a:p>
@@ -4640,121 +5141,18 @@
         </p:nvSpPr>
         <p:spPr/>
         <p:txBody>
-          <a:bodyPr>
-            <a:normAutofit fontScale="85000" lnSpcReduction="20000"/>
-          </a:bodyPr>
-          <a:lstStyle/>
-          <a:p>
-            <a:pPr fontAlgn="base"/>
-            <a:r>
-              <a:rPr lang="en-US" b="0" dirty="0"/>
-              <a:t>({}–&gt;</a:t>
-            </a:r>
-            <a:r>
-              <a:rPr lang="en-US" b="0" dirty="0" smtClean="0"/>
-              <a:t>null</a:t>
-            </a:r>
-            <a:r>
-              <a:rPr lang="en-US" b="0" dirty="0"/>
-              <a:t>) no code at all-&gt;code that </a:t>
-            </a:r>
-            <a:r>
-              <a:rPr lang="en-US" b="0"/>
-              <a:t>employs </a:t>
-            </a:r>
-            <a:r>
-              <a:rPr lang="en-US" b="0" smtClean="0"/>
-              <a:t>null</a:t>
-            </a:r>
-            <a:endParaRPr lang="en-US" b="0" dirty="0"/>
-          </a:p>
-          <a:p>
-            <a:pPr fontAlgn="base"/>
-            <a:r>
-              <a:rPr lang="en-US" b="0" dirty="0"/>
-              <a:t>(</a:t>
-            </a:r>
-            <a:r>
-              <a:rPr lang="en-US" b="0" dirty="0" smtClean="0"/>
-              <a:t>null-</a:t>
-            </a:r>
-            <a:r>
-              <a:rPr lang="en-US" b="0" dirty="0"/>
-              <a:t>&gt;constant)</a:t>
-            </a:r>
-          </a:p>
-          <a:p>
-            <a:pPr fontAlgn="base"/>
-            <a:r>
-              <a:rPr lang="en-US" b="0" dirty="0"/>
-              <a:t>(constant-&gt;constant+) a simple constant to a more complex constant</a:t>
-            </a:r>
-          </a:p>
-          <a:p>
-            <a:pPr fontAlgn="base"/>
-            <a:r>
-              <a:rPr lang="en-US" b="0" dirty="0"/>
-              <a:t>(constant-&gt;scalar) replacing a constant with a variable or an argument</a:t>
-            </a:r>
-          </a:p>
-          <a:p>
-            <a:pPr fontAlgn="base"/>
-            <a:r>
-              <a:rPr lang="en-US" b="0" dirty="0"/>
-              <a:t>(statement-&gt;statements) adding more unconditional statements.</a:t>
-            </a:r>
-          </a:p>
-          <a:p>
-            <a:pPr fontAlgn="base"/>
-            <a:r>
-              <a:rPr lang="en-US" b="0" dirty="0"/>
-              <a:t>(unconditional-&gt;if) splitting the execution path</a:t>
-            </a:r>
-          </a:p>
-          <a:p>
-            <a:pPr fontAlgn="base"/>
-            <a:r>
-              <a:rPr lang="en-US" b="0" dirty="0"/>
-              <a:t>(scalar-&gt;array)</a:t>
-            </a:r>
-          </a:p>
-          <a:p>
-            <a:pPr fontAlgn="base"/>
-            <a:r>
-              <a:rPr lang="en-US" b="0" dirty="0"/>
-              <a:t>(array-&gt;container)</a:t>
-            </a:r>
-          </a:p>
-          <a:p>
-            <a:pPr fontAlgn="base"/>
-            <a:r>
-              <a:rPr lang="en-US" b="0" dirty="0"/>
-              <a:t>(statement-&gt;recursion)</a:t>
-            </a:r>
-          </a:p>
-          <a:p>
-            <a:pPr fontAlgn="base"/>
-            <a:r>
-              <a:rPr lang="en-US" b="0" dirty="0"/>
-              <a:t>(if-&gt;while)</a:t>
-            </a:r>
-          </a:p>
-          <a:p>
-            <a:pPr fontAlgn="base"/>
-            <a:r>
-              <a:rPr lang="en-US" b="0" dirty="0"/>
-              <a:t>(expression-&gt;function) replacing an expression with a function or algorithm</a:t>
-            </a:r>
-          </a:p>
-          <a:p>
-            <a:pPr fontAlgn="base"/>
-            <a:r>
-              <a:rPr lang="en-US" b="0" dirty="0"/>
-              <a:t>(variable-&gt;assignment) replacing the value of a variable.</a:t>
-            </a:r>
-          </a:p>
-          <a:p>
-            <a:endParaRPr lang="en-US" dirty="0"/>
+          <a:bodyPr/>
+          <a:lstStyle/>
+          <a:p>
+            <a:r>
+              <a:rPr lang="en-US" dirty="0" smtClean="0"/>
+              <a:t>Let’s write a method to add two </a:t>
+            </a:r>
+            <a:r>
+              <a:rPr lang="en-US" smtClean="0"/>
+              <a:t>positive integers</a:t>
+            </a:r>
+            <a:endParaRPr lang="en-US" dirty="0" smtClean="0"/>
           </a:p>
         </p:txBody>
       </p:sp>
@@ -4778,51 +5176,26 @@
               <a:t>7</a:t>
             </a:fld>
             <a:endParaRPr lang="en-US"/>
-          </a:p>
-        </p:txBody>
-      </p:sp>
-      <p:sp>
-        <p:nvSpPr>
-          <p:cNvPr id="6" name="Footer Placeholder 5"/>
-          <p:cNvSpPr>
-            <a:spLocks noGrp="1"/>
-          </p:cNvSpPr>
-          <p:nvPr>
-            <p:ph type="ftr" sz="quarter" idx="11"/>
-          </p:nvPr>
-        </p:nvSpPr>
-        <p:spPr/>
-        <p:txBody>
-          <a:bodyPr/>
-          <a:lstStyle/>
-          <a:p>
-            <a:r>
-              <a:rPr lang="en-US" dirty="0"/>
-              <a:t>Source: </a:t>
-            </a:r>
-            <a:r>
-              <a:rPr lang="en-US" dirty="0">
-                <a:hlinkClick r:id="rId2"/>
-              </a:rPr>
-              <a:t>Bob Martin</a:t>
-            </a:r>
-            <a:endParaRPr lang="en-US" dirty="0"/>
-          </a:p>
-          <a:p>
-            <a:endParaRPr lang="en-US" dirty="0"/>
           </a:p>
         </p:txBody>
       </p:sp>
     </p:spTree>
     <p:extLst>
       <p:ext uri="{BB962C8B-B14F-4D97-AF65-F5344CB8AC3E}">
-        <p14:creationId xmlns:p14="http://schemas.microsoft.com/office/powerpoint/2010/main" val="3063786004"/>
+        <p14:creationId xmlns:p14="http://schemas.microsoft.com/office/powerpoint/2010/main" val="3915016319"/>
       </p:ext>
     </p:extLst>
   </p:cSld>
   <p:clrMapOvr>
     <a:masterClrMapping/>
   </p:clrMapOvr>
+  <p:timing>
+    <p:tnLst>
+      <p:par>
+        <p:cTn id="1" dur="indefinite" restart="never" nodeType="tmRoot"/>
+      </p:par>
+    </p:tnLst>
+  </p:timing>
 </p:sld>
 </file>
 
@@ -4860,7 +5233,7 @@
           <a:p>
             <a:r>
               <a:rPr lang="en-US" dirty="0" smtClean="0"/>
-              <a:t>TDD Guidelines</a:t>
+              <a:t>Law of Demeter</a:t>
             </a:r>
             <a:endParaRPr lang="en-US" dirty="0"/>
           </a:p>
@@ -4878,92 +5251,35 @@
         </p:nvSpPr>
         <p:spPr/>
         <p:txBody>
-          <a:bodyPr>
-            <a:normAutofit lnSpcReduction="10000"/>
-          </a:bodyPr>
-          <a:lstStyle/>
-          <a:p>
-            <a:r>
-              <a:rPr lang="en-US" dirty="0" smtClean="0"/>
-              <a:t>The following guidelines will help you write better tests</a:t>
+          <a:bodyPr/>
+          <a:lstStyle/>
+          <a:p>
+            <a:r>
+              <a:rPr lang="en-US" dirty="0" smtClean="0"/>
+              <a:t>The Law of Demeter helps us to write more testable code.</a:t>
             </a:r>
           </a:p>
           <a:p>
             <a:pPr marL="800100" lvl="1" indent="-342900"/>
             <a:r>
               <a:rPr lang="en-US" dirty="0" smtClean="0"/>
-              <a:t>Each test verifies exactly one thing –one assert per test</a:t>
+              <a:t>Provide the minimum information necessary to a method</a:t>
             </a:r>
           </a:p>
           <a:p>
             <a:pPr marL="800100" lvl="1" indent="-342900"/>
             <a:r>
               <a:rPr lang="en-US" dirty="0" smtClean="0"/>
-              <a:t>Use a descriptive name for each test</a:t>
+              <a:t>Provides for loose coupling</a:t>
             </a:r>
           </a:p>
           <a:p>
             <a:pPr marL="800100" lvl="1" indent="-342900"/>
             <a:r>
               <a:rPr lang="en-US" dirty="0" smtClean="0"/>
-              <a:t>Think about building tests with this structure:</a:t>
-            </a:r>
-          </a:p>
-          <a:p>
-            <a:pPr marL="1485900" lvl="2" indent="-342900"/>
-            <a:r>
-              <a:rPr lang="en-US" dirty="0" smtClean="0"/>
-              <a:t>Given</a:t>
-            </a:r>
-          </a:p>
-          <a:p>
-            <a:pPr marL="1485900" lvl="2" indent="-342900"/>
-            <a:r>
-              <a:rPr lang="en-US" dirty="0" smtClean="0"/>
-              <a:t>When</a:t>
-            </a:r>
-          </a:p>
-          <a:p>
-            <a:pPr marL="1485900" lvl="2" indent="-342900"/>
-            <a:r>
-              <a:rPr lang="en-US" dirty="0" smtClean="0"/>
-              <a:t>Then</a:t>
-            </a:r>
-          </a:p>
-          <a:p>
-            <a:pPr marL="800100" lvl="1" indent="-342900"/>
-            <a:r>
-              <a:rPr lang="en-US" dirty="0" smtClean="0"/>
-              <a:t>Always write a failing test first that fails as you expect</a:t>
-            </a:r>
-          </a:p>
-          <a:p>
-            <a:pPr marL="342900" indent="-342900"/>
-            <a:r>
-              <a:rPr lang="en-US" dirty="0" smtClean="0"/>
-              <a:t>TDD requires</a:t>
-            </a:r>
-          </a:p>
-          <a:p>
-            <a:pPr marL="800100" lvl="1" indent="-342900"/>
-            <a:r>
-              <a:rPr lang="en-US" dirty="0" smtClean="0"/>
-              <a:t>Practice</a:t>
-            </a:r>
-          </a:p>
-          <a:p>
-            <a:pPr marL="800100" lvl="1" indent="-342900"/>
-            <a:r>
-              <a:rPr lang="en-US" dirty="0" smtClean="0"/>
-              <a:t>Discipline</a:t>
-            </a:r>
-          </a:p>
-          <a:p>
-            <a:pPr marL="800100" lvl="1" indent="-342900"/>
-            <a:r>
-              <a:rPr lang="en-US" dirty="0" smtClean="0"/>
-              <a:t>Tenacity</a:t>
-            </a:r>
+              <a:t>Loose coupling leads to testable code that is easier to understand</a:t>
+            </a:r>
+            <a:endParaRPr lang="en-US" dirty="0"/>
           </a:p>
         </p:txBody>
       </p:sp>
@@ -4993,13 +5309,20 @@
     </p:spTree>
     <p:extLst>
       <p:ext uri="{BB962C8B-B14F-4D97-AF65-F5344CB8AC3E}">
-        <p14:creationId xmlns:p14="http://schemas.microsoft.com/office/powerpoint/2010/main" val="1113473894"/>
+        <p14:creationId xmlns:p14="http://schemas.microsoft.com/office/powerpoint/2010/main" val="3879633814"/>
       </p:ext>
     </p:extLst>
   </p:cSld>
   <p:clrMapOvr>
     <a:masterClrMapping/>
   </p:clrMapOvr>
+  <p:timing>
+    <p:tnLst>
+      <p:par>
+        <p:cTn id="1" dur="indefinite" restart="never" nodeType="tmRoot"/>
+      </p:par>
+    </p:tnLst>
+  </p:timing>
 </p:sld>
 </file>
 
@@ -5037,7 +5360,7 @@
           <a:p>
             <a:r>
               <a:rPr lang="en-US" dirty="0" smtClean="0"/>
-              <a:t>Benefits of TDD</a:t>
+              <a:t>Law of Demeter example</a:t>
             </a:r>
             <a:endParaRPr lang="en-US" dirty="0"/>
           </a:p>
@@ -5055,56 +5378,298 @@
         </p:nvSpPr>
         <p:spPr/>
         <p:txBody>
-          <a:bodyPr/>
-          <a:lstStyle/>
-          <a:p>
-            <a:r>
-              <a:rPr lang="en-US" dirty="0" smtClean="0"/>
-              <a:t>Test Driven Design provides some important benefits</a:t>
-            </a:r>
-          </a:p>
-          <a:p>
-            <a:pPr marL="800100" lvl="1" indent="-342900"/>
-            <a:r>
-              <a:rPr lang="en-US" dirty="0" smtClean="0"/>
-              <a:t>Your code does exactly what you expect, nothing more, nothing less</a:t>
-            </a:r>
-          </a:p>
-          <a:p>
-            <a:pPr marL="1485900" lvl="2" indent="-342900"/>
-            <a:r>
-              <a:rPr lang="en-US" dirty="0" smtClean="0"/>
-              <a:t>Aids in debugging complex problems</a:t>
-            </a:r>
-          </a:p>
-          <a:p>
-            <a:pPr marL="1485900" lvl="2" indent="-342900"/>
-            <a:r>
-              <a:rPr lang="en-US" dirty="0" smtClean="0"/>
-              <a:t>Concurrent development will challenge most of your expectations</a:t>
-            </a:r>
-          </a:p>
-          <a:p>
-            <a:pPr marL="1485900" lvl="2" indent="-342900"/>
-            <a:r>
-              <a:rPr lang="en-US" dirty="0" smtClean="0"/>
-              <a:t>Bugs become unexpected cases, not unexpected behavior</a:t>
-            </a:r>
-          </a:p>
-          <a:p>
-            <a:pPr marL="800100" lvl="1" indent="-342900"/>
-            <a:r>
-              <a:rPr lang="en-US" dirty="0" smtClean="0"/>
-              <a:t>The interface to your code is usually better</a:t>
-            </a:r>
-          </a:p>
-          <a:p>
-            <a:pPr marL="800100" lvl="1" indent="-342900"/>
-            <a:r>
-              <a:rPr lang="en-US" dirty="0" smtClean="0"/>
-              <a:t>Your can change the code in the future with confidence</a:t>
-            </a:r>
-            <a:endParaRPr lang="en-US" dirty="0"/>
+          <a:bodyPr>
+            <a:normAutofit lnSpcReduction="10000"/>
+          </a:bodyPr>
+          <a:lstStyle/>
+          <a:p>
+            <a:r>
+              <a:rPr lang="en-US" dirty="0" smtClean="0"/>
+              <a:t>This is a violation of the Law of Demeter:</a:t>
+            </a:r>
+          </a:p>
+          <a:p>
+            <a:endParaRPr lang="en-US" dirty="0" smtClean="0"/>
+          </a:p>
+          <a:p>
+            <a:r>
+              <a:rPr lang="en-US" dirty="0" err="1" smtClean="0">
+                <a:latin typeface="Courier New" panose="02070309020205020404" pitchFamily="49" charset="0"/>
+                <a:cs typeface="Courier New" panose="02070309020205020404" pitchFamily="49" charset="0"/>
+              </a:rPr>
+              <a:t>std</a:t>
+            </a:r>
+            <a:r>
+              <a:rPr lang="en-US" dirty="0">
+                <a:latin typeface="Courier New" panose="02070309020205020404" pitchFamily="49" charset="0"/>
+                <a:cs typeface="Courier New" panose="02070309020205020404" pitchFamily="49" charset="0"/>
+              </a:rPr>
+              <a:t>::</a:t>
+            </a:r>
+            <a:r>
+              <a:rPr lang="en-US" dirty="0">
+                <a:solidFill>
+                  <a:srgbClr val="7F0055"/>
+                </a:solidFill>
+                <a:latin typeface="Courier New" panose="02070309020205020404" pitchFamily="49" charset="0"/>
+                <a:cs typeface="Courier New" panose="02070309020205020404" pitchFamily="49" charset="0"/>
+              </a:rPr>
+              <a:t>string</a:t>
+            </a:r>
+            <a:r>
+              <a:rPr lang="en-US" dirty="0">
+                <a:latin typeface="Courier New" panose="02070309020205020404" pitchFamily="49" charset="0"/>
+                <a:cs typeface="Courier New" panose="02070309020205020404" pitchFamily="49" charset="0"/>
+              </a:rPr>
+              <a:t> </a:t>
+            </a:r>
+            <a:r>
+              <a:rPr lang="en-US" dirty="0" err="1">
+                <a:latin typeface="Courier New" panose="02070309020205020404" pitchFamily="49" charset="0"/>
+                <a:cs typeface="Courier New" panose="02070309020205020404" pitchFamily="49" charset="0"/>
+              </a:rPr>
+              <a:t>get_name</a:t>
+            </a:r>
+            <a:r>
+              <a:rPr lang="en-US" dirty="0">
+                <a:latin typeface="Courier New" panose="02070309020205020404" pitchFamily="49" charset="0"/>
+                <a:cs typeface="Courier New" panose="02070309020205020404" pitchFamily="49" charset="0"/>
+              </a:rPr>
+              <a:t>(</a:t>
+            </a:r>
+            <a:r>
+              <a:rPr lang="en-US" dirty="0" err="1">
+                <a:latin typeface="Courier New" panose="02070309020205020404" pitchFamily="49" charset="0"/>
+                <a:cs typeface="Courier New" panose="02070309020205020404" pitchFamily="49" charset="0"/>
+              </a:rPr>
+              <a:t>employee_record</a:t>
+            </a:r>
+            <a:r>
+              <a:rPr lang="en-US" dirty="0">
+                <a:latin typeface="Courier New" panose="02070309020205020404" pitchFamily="49" charset="0"/>
+                <a:cs typeface="Courier New" panose="02070309020205020404" pitchFamily="49" charset="0"/>
+              </a:rPr>
+              <a:t> employee</a:t>
+            </a:r>
+            <a:r>
+              <a:rPr lang="en-US" dirty="0" smtClean="0">
+                <a:latin typeface="Courier New" panose="02070309020205020404" pitchFamily="49" charset="0"/>
+                <a:cs typeface="Courier New" panose="02070309020205020404" pitchFamily="49" charset="0"/>
+              </a:rPr>
+              <a:t>){</a:t>
+            </a:r>
+          </a:p>
+          <a:p>
+            <a:r>
+              <a:rPr lang="en-US" dirty="0">
+                <a:solidFill>
+                  <a:srgbClr val="7F0055"/>
+                </a:solidFill>
+                <a:latin typeface="Courier New" panose="02070309020205020404" pitchFamily="49" charset="0"/>
+                <a:cs typeface="Courier New" panose="02070309020205020404" pitchFamily="49" charset="0"/>
+              </a:rPr>
+              <a:t> </a:t>
+            </a:r>
+            <a:r>
+              <a:rPr lang="en-US" dirty="0" smtClean="0">
+                <a:solidFill>
+                  <a:srgbClr val="7F0055"/>
+                </a:solidFill>
+                <a:latin typeface="Courier New" panose="02070309020205020404" pitchFamily="49" charset="0"/>
+                <a:cs typeface="Courier New" panose="02070309020205020404" pitchFamily="49" charset="0"/>
+              </a:rPr>
+              <a:t> return</a:t>
+            </a:r>
+            <a:r>
+              <a:rPr lang="en-US" dirty="0" smtClean="0">
+                <a:latin typeface="Courier New" panose="02070309020205020404" pitchFamily="49" charset="0"/>
+                <a:cs typeface="Courier New" panose="02070309020205020404" pitchFamily="49" charset="0"/>
+              </a:rPr>
+              <a:t> </a:t>
+            </a:r>
+            <a:r>
+              <a:rPr lang="en-US" dirty="0" err="1">
+                <a:latin typeface="Courier New" panose="02070309020205020404" pitchFamily="49" charset="0"/>
+                <a:cs typeface="Courier New" panose="02070309020205020404" pitchFamily="49" charset="0"/>
+              </a:rPr>
+              <a:t>name_table</a:t>
+            </a:r>
+            <a:r>
+              <a:rPr lang="en-US" dirty="0">
+                <a:latin typeface="Courier New" panose="02070309020205020404" pitchFamily="49" charset="0"/>
+                <a:cs typeface="Courier New" panose="02070309020205020404" pitchFamily="49" charset="0"/>
+              </a:rPr>
+              <a:t>_[employeed.id</a:t>
+            </a:r>
+            <a:r>
+              <a:rPr lang="en-US" dirty="0" smtClean="0">
+                <a:latin typeface="Courier New" panose="02070309020205020404" pitchFamily="49" charset="0"/>
+                <a:cs typeface="Courier New" panose="02070309020205020404" pitchFamily="49" charset="0"/>
+              </a:rPr>
+              <a:t>];</a:t>
+            </a:r>
+          </a:p>
+          <a:p>
+            <a:r>
+              <a:rPr lang="en-US" dirty="0" smtClean="0">
+                <a:latin typeface="Courier New" panose="02070309020205020404" pitchFamily="49" charset="0"/>
+                <a:cs typeface="Courier New" panose="02070309020205020404" pitchFamily="49" charset="0"/>
+              </a:rPr>
+              <a:t>}</a:t>
+            </a:r>
+          </a:p>
+          <a:p>
+            <a:r>
+              <a:rPr lang="en-US" dirty="0" smtClean="0">
+                <a:latin typeface="Arial" panose="020B0604020202020204" pitchFamily="34" charset="0"/>
+                <a:cs typeface="Arial" panose="020B0604020202020204" pitchFamily="34" charset="0"/>
+              </a:rPr>
+              <a:t>Here is a better implementation:</a:t>
+            </a:r>
+          </a:p>
+          <a:p>
+            <a:endParaRPr lang="en-US" dirty="0" smtClean="0">
+              <a:latin typeface="Arial" panose="020B0604020202020204" pitchFamily="34" charset="0"/>
+              <a:cs typeface="Arial" panose="020B0604020202020204" pitchFamily="34" charset="0"/>
+            </a:endParaRPr>
+          </a:p>
+          <a:p>
+            <a:r>
+              <a:rPr lang="en-US" dirty="0" err="1" smtClean="0">
+                <a:latin typeface="Courier New" panose="02070309020205020404" pitchFamily="49" charset="0"/>
+                <a:cs typeface="Courier New" panose="02070309020205020404" pitchFamily="49" charset="0"/>
+              </a:rPr>
+              <a:t>std</a:t>
+            </a:r>
+            <a:r>
+              <a:rPr lang="en-US" dirty="0">
+                <a:latin typeface="Courier New" panose="02070309020205020404" pitchFamily="49" charset="0"/>
+                <a:cs typeface="Courier New" panose="02070309020205020404" pitchFamily="49" charset="0"/>
+              </a:rPr>
+              <a:t>::</a:t>
+            </a:r>
+            <a:r>
+              <a:rPr lang="en-US" dirty="0">
+                <a:solidFill>
+                  <a:srgbClr val="7F0055"/>
+                </a:solidFill>
+                <a:latin typeface="Courier New" panose="02070309020205020404" pitchFamily="49" charset="0"/>
+                <a:cs typeface="Courier New" panose="02070309020205020404" pitchFamily="49" charset="0"/>
+              </a:rPr>
+              <a:t>string</a:t>
+            </a:r>
+            <a:r>
+              <a:rPr lang="en-US" dirty="0">
+                <a:latin typeface="Courier New" panose="02070309020205020404" pitchFamily="49" charset="0"/>
+                <a:cs typeface="Courier New" panose="02070309020205020404" pitchFamily="49" charset="0"/>
+              </a:rPr>
+              <a:t> </a:t>
+            </a:r>
+            <a:r>
+              <a:rPr lang="en-US" dirty="0" err="1">
+                <a:latin typeface="Courier New" panose="02070309020205020404" pitchFamily="49" charset="0"/>
+                <a:cs typeface="Courier New" panose="02070309020205020404" pitchFamily="49" charset="0"/>
+              </a:rPr>
+              <a:t>get_name</a:t>
+            </a:r>
+            <a:r>
+              <a:rPr lang="en-US" dirty="0">
+                <a:latin typeface="Courier New" panose="02070309020205020404" pitchFamily="49" charset="0"/>
+                <a:cs typeface="Courier New" panose="02070309020205020404" pitchFamily="49" charset="0"/>
+              </a:rPr>
+              <a:t>(</a:t>
+            </a:r>
+            <a:r>
+              <a:rPr lang="en-US" dirty="0" err="1">
+                <a:solidFill>
+                  <a:srgbClr val="7F0055"/>
+                </a:solidFill>
+                <a:latin typeface="Courier New" panose="02070309020205020404" pitchFamily="49" charset="0"/>
+                <a:cs typeface="Courier New" panose="02070309020205020404" pitchFamily="49" charset="0"/>
+              </a:rPr>
+              <a:t>int</a:t>
+            </a:r>
+            <a:r>
+              <a:rPr lang="en-US" dirty="0">
+                <a:latin typeface="Courier New" panose="02070309020205020404" pitchFamily="49" charset="0"/>
+                <a:cs typeface="Courier New" panose="02070309020205020404" pitchFamily="49" charset="0"/>
+              </a:rPr>
+              <a:t> </a:t>
+            </a:r>
+            <a:r>
+              <a:rPr lang="en-US" dirty="0" err="1">
+                <a:latin typeface="Courier New" panose="02070309020205020404" pitchFamily="49" charset="0"/>
+                <a:cs typeface="Courier New" panose="02070309020205020404" pitchFamily="49" charset="0"/>
+              </a:rPr>
+              <a:t>employee_id</a:t>
+            </a:r>
+            <a:r>
+              <a:rPr lang="en-US" dirty="0" smtClean="0">
+                <a:latin typeface="Courier New" panose="02070309020205020404" pitchFamily="49" charset="0"/>
+                <a:cs typeface="Courier New" panose="02070309020205020404" pitchFamily="49" charset="0"/>
+              </a:rPr>
+              <a:t>){</a:t>
+            </a:r>
+          </a:p>
+          <a:p>
+            <a:r>
+              <a:rPr lang="en-US" dirty="0" smtClean="0">
+                <a:solidFill>
+                  <a:srgbClr val="7F0055"/>
+                </a:solidFill>
+                <a:latin typeface="Courier New" panose="02070309020205020404" pitchFamily="49" charset="0"/>
+                <a:cs typeface="Courier New" panose="02070309020205020404" pitchFamily="49" charset="0"/>
+              </a:rPr>
+              <a:t>  return</a:t>
+            </a:r>
+            <a:r>
+              <a:rPr lang="en-US" dirty="0" smtClean="0">
+                <a:latin typeface="Courier New" panose="02070309020205020404" pitchFamily="49" charset="0"/>
+                <a:cs typeface="Courier New" panose="02070309020205020404" pitchFamily="49" charset="0"/>
+              </a:rPr>
+              <a:t> </a:t>
+            </a:r>
+            <a:r>
+              <a:rPr lang="en-US" dirty="0" err="1">
+                <a:latin typeface="Courier New" panose="02070309020205020404" pitchFamily="49" charset="0"/>
+                <a:cs typeface="Courier New" panose="02070309020205020404" pitchFamily="49" charset="0"/>
+              </a:rPr>
+              <a:t>name_table</a:t>
+            </a:r>
+            <a:r>
+              <a:rPr lang="en-US" dirty="0">
+                <a:latin typeface="Courier New" panose="02070309020205020404" pitchFamily="49" charset="0"/>
+                <a:cs typeface="Courier New" panose="02070309020205020404" pitchFamily="49" charset="0"/>
+              </a:rPr>
+              <a:t>_[</a:t>
+            </a:r>
+            <a:r>
+              <a:rPr lang="en-US" dirty="0" err="1">
+                <a:latin typeface="Courier New" panose="02070309020205020404" pitchFamily="49" charset="0"/>
+                <a:cs typeface="Courier New" panose="02070309020205020404" pitchFamily="49" charset="0"/>
+              </a:rPr>
+              <a:t>employee_id</a:t>
+            </a:r>
+            <a:r>
+              <a:rPr lang="en-US" dirty="0" smtClean="0">
+                <a:latin typeface="Courier New" panose="02070309020205020404" pitchFamily="49" charset="0"/>
+                <a:cs typeface="Courier New" panose="02070309020205020404" pitchFamily="49" charset="0"/>
+              </a:rPr>
+              <a:t>];</a:t>
+            </a:r>
+          </a:p>
+          <a:p>
+            <a:r>
+              <a:rPr lang="en-US" dirty="0" smtClean="0">
+                <a:latin typeface="Courier New" panose="02070309020205020404" pitchFamily="49" charset="0"/>
+                <a:cs typeface="Courier New" panose="02070309020205020404" pitchFamily="49" charset="0"/>
+              </a:rPr>
+              <a:t>}</a:t>
+            </a:r>
+            <a:endParaRPr lang="en-US" dirty="0">
+              <a:latin typeface="Courier New" panose="02070309020205020404" pitchFamily="49" charset="0"/>
+              <a:cs typeface="Courier New" panose="02070309020205020404" pitchFamily="49" charset="0"/>
+            </a:endParaRPr>
           </a:p>
         </p:txBody>
       </p:sp>
@@ -5131,16 +5696,405 @@
           </a:p>
         </p:txBody>
       </p:sp>
+      <p:sp>
+        <p:nvSpPr>
+          <p:cNvPr id="5" name="Rectangle 4"/>
+          <p:cNvSpPr/>
+          <p:nvPr/>
+        </p:nvSpPr>
+        <p:spPr>
+          <a:xfrm>
+            <a:off x="4876800" y="3505200"/>
+            <a:ext cx="2971800" cy="914400"/>
+          </a:xfrm>
+          <a:prstGeom prst="rect">
+            <a:avLst/>
+          </a:prstGeom>
+        </p:spPr>
+        <p:style>
+          <a:lnRef idx="2">
+            <a:schemeClr val="accent1">
+              <a:shade val="50000"/>
+            </a:schemeClr>
+          </a:lnRef>
+          <a:fillRef idx="1">
+            <a:schemeClr val="accent1"/>
+          </a:fillRef>
+          <a:effectRef idx="0">
+            <a:schemeClr val="accent1"/>
+          </a:effectRef>
+          <a:fontRef idx="minor">
+            <a:schemeClr val="lt1"/>
+          </a:fontRef>
+        </p:style>
+        <p:txBody>
+          <a:bodyPr rtlCol="0" anchor="ctr"/>
+          <a:lstStyle/>
+          <a:p>
+            <a:pPr algn="ctr"/>
+            <a:r>
+              <a:rPr lang="en-US" dirty="0" smtClean="0"/>
+              <a:t>No need for the entire </a:t>
+            </a:r>
+            <a:r>
+              <a:rPr lang="en-US" dirty="0" err="1" smtClean="0">
+                <a:latin typeface="Courier New" panose="02070309020205020404" pitchFamily="49" charset="0"/>
+                <a:cs typeface="Courier New" panose="02070309020205020404" pitchFamily="49" charset="0"/>
+              </a:rPr>
+              <a:t>employee_record</a:t>
+            </a:r>
+            <a:endParaRPr lang="en-US" dirty="0">
+              <a:latin typeface="Courier New" panose="02070309020205020404" pitchFamily="49" charset="0"/>
+              <a:cs typeface="Courier New" panose="02070309020205020404" pitchFamily="49" charset="0"/>
+            </a:endParaRPr>
+          </a:p>
+        </p:txBody>
+      </p:sp>
+      <p:cxnSp>
+        <p:nvCxnSpPr>
+          <p:cNvPr id="7" name="Straight Arrow Connector 6"/>
+          <p:cNvCxnSpPr/>
+          <p:nvPr/>
+        </p:nvCxnSpPr>
+        <p:spPr>
+          <a:xfrm flipH="1" flipV="1">
+            <a:off x="6076950" y="2971800"/>
+            <a:ext cx="285750" cy="533400"/>
+          </a:xfrm>
+          <a:prstGeom prst="straightConnector1">
+            <a:avLst/>
+          </a:prstGeom>
+          <a:ln>
+            <a:tailEnd type="arrow"/>
+          </a:ln>
+        </p:spPr>
+        <p:style>
+          <a:lnRef idx="3">
+            <a:schemeClr val="accent5"/>
+          </a:lnRef>
+          <a:fillRef idx="0">
+            <a:schemeClr val="accent5"/>
+          </a:fillRef>
+          <a:effectRef idx="2">
+            <a:schemeClr val="accent5"/>
+          </a:effectRef>
+          <a:fontRef idx="minor">
+            <a:schemeClr val="tx1"/>
+          </a:fontRef>
+        </p:style>
+      </p:cxnSp>
     </p:spTree>
     <p:extLst>
       <p:ext uri="{BB962C8B-B14F-4D97-AF65-F5344CB8AC3E}">
-        <p14:creationId xmlns:p14="http://schemas.microsoft.com/office/powerpoint/2010/main" val="311232569"/>
+        <p14:creationId xmlns:p14="http://schemas.microsoft.com/office/powerpoint/2010/main" val="3793243716"/>
       </p:ext>
     </p:extLst>
   </p:cSld>
   <p:clrMapOvr>
     <a:masterClrMapping/>
   </p:clrMapOvr>
+  <p:timing>
+    <p:tnLst>
+      <p:par>
+        <p:cTn id="1" dur="indefinite" restart="never" nodeType="tmRoot">
+          <p:childTnLst>
+            <p:seq concurrent="1" nextAc="seek">
+              <p:cTn id="2" dur="indefinite" nodeType="mainSeq">
+                <p:childTnLst>
+                  <p:par>
+                    <p:cTn id="3" fill="hold">
+                      <p:stCondLst>
+                        <p:cond delay="indefinite"/>
+                      </p:stCondLst>
+                      <p:childTnLst>
+                        <p:par>
+                          <p:cTn id="4" fill="hold">
+                            <p:stCondLst>
+                              <p:cond delay="0"/>
+                            </p:stCondLst>
+                            <p:childTnLst>
+                              <p:par>
+                                <p:cTn id="5" presetID="1" presetClass="entr" presetSubtype="0" fill="hold" grpId="0" nodeType="clickEffect">
+                                  <p:stCondLst>
+                                    <p:cond delay="0"/>
+                                  </p:stCondLst>
+                                  <p:childTnLst>
+                                    <p:set>
+                                      <p:cBhvr>
+                                        <p:cTn id="6" dur="1" fill="hold">
+                                          <p:stCondLst>
+                                            <p:cond delay="0"/>
+                                          </p:stCondLst>
+                                        </p:cTn>
+                                        <p:tgtEl>
+                                          <p:spTgt spid="5"/>
+                                        </p:tgtEl>
+                                        <p:attrNameLst>
+                                          <p:attrName>style.visibility</p:attrName>
+                                        </p:attrNameLst>
+                                      </p:cBhvr>
+                                      <p:to>
+                                        <p:strVal val="visible"/>
+                                      </p:to>
+                                    </p:set>
+                                  </p:childTnLst>
+                                </p:cTn>
+                              </p:par>
+                              <p:par>
+                                <p:cTn id="7" presetID="1" presetClass="entr" presetSubtype="0" fill="hold" nodeType="withEffect">
+                                  <p:stCondLst>
+                                    <p:cond delay="0"/>
+                                  </p:stCondLst>
+                                  <p:childTnLst>
+                                    <p:set>
+                                      <p:cBhvr>
+                                        <p:cTn id="8" dur="1" fill="hold">
+                                          <p:stCondLst>
+                                            <p:cond delay="0"/>
+                                          </p:stCondLst>
+                                        </p:cTn>
+                                        <p:tgtEl>
+                                          <p:spTgt spid="7"/>
+                                        </p:tgtEl>
+                                        <p:attrNameLst>
+                                          <p:attrName>style.visibility</p:attrName>
+                                        </p:attrNameLst>
+                                      </p:cBhvr>
+                                      <p:to>
+                                        <p:strVal val="visible"/>
+                                      </p:to>
+                                    </p:set>
+                                  </p:childTnLst>
+                                </p:cTn>
+                              </p:par>
+                            </p:childTnLst>
+                          </p:cTn>
+                        </p:par>
+                      </p:childTnLst>
+                    </p:cTn>
+                  </p:par>
+                  <p:par>
+                    <p:cTn id="9" fill="hold">
+                      <p:stCondLst>
+                        <p:cond delay="indefinite"/>
+                      </p:stCondLst>
+                      <p:childTnLst>
+                        <p:par>
+                          <p:cTn id="10" fill="hold">
+                            <p:stCondLst>
+                              <p:cond delay="0"/>
+                            </p:stCondLst>
+                            <p:childTnLst>
+                              <p:par>
+                                <p:cTn id="11" presetID="1" presetClass="exit" presetSubtype="0" fill="hold" grpId="1" nodeType="clickEffect">
+                                  <p:stCondLst>
+                                    <p:cond delay="0"/>
+                                  </p:stCondLst>
+                                  <p:childTnLst>
+                                    <p:set>
+                                      <p:cBhvr>
+                                        <p:cTn id="12" dur="1" fill="hold">
+                                          <p:stCondLst>
+                                            <p:cond delay="0"/>
+                                          </p:stCondLst>
+                                        </p:cTn>
+                                        <p:tgtEl>
+                                          <p:spTgt spid="5"/>
+                                        </p:tgtEl>
+                                        <p:attrNameLst>
+                                          <p:attrName>style.visibility</p:attrName>
+                                        </p:attrNameLst>
+                                      </p:cBhvr>
+                                      <p:to>
+                                        <p:strVal val="hidden"/>
+                                      </p:to>
+                                    </p:set>
+                                  </p:childTnLst>
+                                </p:cTn>
+                              </p:par>
+                              <p:par>
+                                <p:cTn id="13" presetID="1" presetClass="exit" presetSubtype="0" fill="hold" nodeType="withEffect">
+                                  <p:stCondLst>
+                                    <p:cond delay="0"/>
+                                  </p:stCondLst>
+                                  <p:childTnLst>
+                                    <p:set>
+                                      <p:cBhvr>
+                                        <p:cTn id="14" dur="1" fill="hold">
+                                          <p:stCondLst>
+                                            <p:cond delay="0"/>
+                                          </p:stCondLst>
+                                        </p:cTn>
+                                        <p:tgtEl>
+                                          <p:spTgt spid="7"/>
+                                        </p:tgtEl>
+                                        <p:attrNameLst>
+                                          <p:attrName>style.visibility</p:attrName>
+                                        </p:attrNameLst>
+                                      </p:cBhvr>
+                                      <p:to>
+                                        <p:strVal val="hidden"/>
+                                      </p:to>
+                                    </p:set>
+                                  </p:childTnLst>
+                                </p:cTn>
+                              </p:par>
+                              <p:par>
+                                <p:cTn id="15" presetID="1" presetClass="entr" presetSubtype="0" fill="hold" nodeType="withEffect">
+                                  <p:stCondLst>
+                                    <p:cond delay="0"/>
+                                  </p:stCondLst>
+                                  <p:childTnLst>
+                                    <p:set>
+                                      <p:cBhvr>
+                                        <p:cTn id="16" dur="1" fill="hold">
+                                          <p:stCondLst>
+                                            <p:cond delay="0"/>
+                                          </p:stCondLst>
+                                        </p:cTn>
+                                        <p:tgtEl>
+                                          <p:spTgt spid="3">
+                                            <p:txEl>
+                                              <p:pRg st="5" end="5"/>
+                                            </p:txEl>
+                                          </p:spTgt>
+                                        </p:tgtEl>
+                                        <p:attrNameLst>
+                                          <p:attrName>style.visibility</p:attrName>
+                                        </p:attrNameLst>
+                                      </p:cBhvr>
+                                      <p:to>
+                                        <p:strVal val="visible"/>
+                                      </p:to>
+                                    </p:set>
+                                  </p:childTnLst>
+                                </p:cTn>
+                              </p:par>
+                              <p:par>
+                                <p:cTn id="17" presetID="1" presetClass="entr" presetSubtype="0" fill="hold" nodeType="withEffect">
+                                  <p:stCondLst>
+                                    <p:cond delay="0"/>
+                                  </p:stCondLst>
+                                  <p:childTnLst>
+                                    <p:set>
+                                      <p:cBhvr>
+                                        <p:cTn id="18" dur="1" fill="hold">
+                                          <p:stCondLst>
+                                            <p:cond delay="0"/>
+                                          </p:stCondLst>
+                                        </p:cTn>
+                                        <p:tgtEl>
+                                          <p:spTgt spid="3">
+                                            <p:txEl>
+                                              <p:pRg st="7" end="7"/>
+                                            </p:txEl>
+                                          </p:spTgt>
+                                        </p:tgtEl>
+                                        <p:attrNameLst>
+                                          <p:attrName>style.visibility</p:attrName>
+                                        </p:attrNameLst>
+                                      </p:cBhvr>
+                                      <p:to>
+                                        <p:strVal val="visible"/>
+                                      </p:to>
+                                    </p:set>
+                                  </p:childTnLst>
+                                </p:cTn>
+                              </p:par>
+                              <p:par>
+                                <p:cTn id="19" presetID="1" presetClass="entr" presetSubtype="0" fill="hold" nodeType="withEffect">
+                                  <p:stCondLst>
+                                    <p:cond delay="0"/>
+                                  </p:stCondLst>
+                                  <p:childTnLst>
+                                    <p:set>
+                                      <p:cBhvr>
+                                        <p:cTn id="20" dur="1" fill="hold">
+                                          <p:stCondLst>
+                                            <p:cond delay="0"/>
+                                          </p:stCondLst>
+                                        </p:cTn>
+                                        <p:tgtEl>
+                                          <p:spTgt spid="3">
+                                            <p:txEl>
+                                              <p:pRg st="8" end="8"/>
+                                            </p:txEl>
+                                          </p:spTgt>
+                                        </p:tgtEl>
+                                        <p:attrNameLst>
+                                          <p:attrName>style.visibility</p:attrName>
+                                        </p:attrNameLst>
+                                      </p:cBhvr>
+                                      <p:to>
+                                        <p:strVal val="visible"/>
+                                      </p:to>
+                                    </p:set>
+                                  </p:childTnLst>
+                                </p:cTn>
+                              </p:par>
+                              <p:par>
+                                <p:cTn id="21" presetID="1" presetClass="entr" presetSubtype="0" fill="hold" nodeType="withEffect">
+                                  <p:stCondLst>
+                                    <p:cond delay="0"/>
+                                  </p:stCondLst>
+                                  <p:childTnLst>
+                                    <p:set>
+                                      <p:cBhvr>
+                                        <p:cTn id="22" dur="1" fill="hold">
+                                          <p:stCondLst>
+                                            <p:cond delay="0"/>
+                                          </p:stCondLst>
+                                        </p:cTn>
+                                        <p:tgtEl>
+                                          <p:spTgt spid="3">
+                                            <p:txEl>
+                                              <p:pRg st="9" end="9"/>
+                                            </p:txEl>
+                                          </p:spTgt>
+                                        </p:tgtEl>
+                                        <p:attrNameLst>
+                                          <p:attrName>style.visibility</p:attrName>
+                                        </p:attrNameLst>
+                                      </p:cBhvr>
+                                      <p:to>
+                                        <p:strVal val="visible"/>
+                                      </p:to>
+                                    </p:set>
+                                  </p:childTnLst>
+                                </p:cTn>
+                              </p:par>
+                            </p:childTnLst>
+                          </p:cTn>
+                        </p:par>
+                      </p:childTnLst>
+                    </p:cTn>
+                  </p:par>
+                </p:childTnLst>
+              </p:cTn>
+              <p:prevCondLst>
+                <p:cond evt="onPrev" delay="0">
+                  <p:tgtEl>
+                    <p:sldTgt/>
+                  </p:tgtEl>
+                </p:cond>
+              </p:prevCondLst>
+              <p:nextCondLst>
+                <p:cond evt="onNext" delay="0">
+                  <p:tgtEl>
+                    <p:sldTgt/>
+                  </p:tgtEl>
+                </p:cond>
+              </p:nextCondLst>
+            </p:seq>
+          </p:childTnLst>
+        </p:cTn>
+      </p:par>
+    </p:tnLst>
+    <p:bldLst>
+      <p:bldP spid="5" grpId="0" animBg="1"/>
+      <p:bldP spid="5" grpId="1" animBg="1"/>
+    </p:bldLst>
+  </p:timing>
 </p:sld>
 </file>
 

</xml_diff>